<commit_message>
Updating the dependency injection slides
</commit_message>
<xml_diff>
--- a/Slides/DependencyInjection.pptx
+++ b/Slides/DependencyInjection.pptx
@@ -204,7 +204,7 @@
           <a:p>
             <a:fld id="{BC12233A-9640-4760-BBFF-44E1A1BCD563}" type="datetimeFigureOut">
               <a:rPr lang="en-US" smtClean="0"/>
-              <a:t>9/29/2017</a:t>
+              <a:t>10/3/2017</a:t>
             </a:fld>
             <a:endParaRPr lang="en-US"/>
           </a:p>
@@ -1016,7 +1016,7 @@
             <a:fld id="{B61BEF0D-F0BB-DE4B-95CE-6DB70DBA9567}" type="datetimeFigureOut">
               <a:rPr lang="en-US" dirty="0"/>
               <a:pPr/>
-              <a:t>9/29/2017</a:t>
+              <a:t>10/3/2017</a:t>
             </a:fld>
             <a:endParaRPr lang="en-US" dirty="0"/>
           </a:p>
@@ -1449,7 +1449,7 @@
             <a:fld id="{B61BEF0D-F0BB-DE4B-95CE-6DB70DBA9567}" type="datetimeFigureOut">
               <a:rPr lang="en-US" dirty="0"/>
               <a:pPr/>
-              <a:t>9/29/2017</a:t>
+              <a:t>10/3/2017</a:t>
             </a:fld>
             <a:endParaRPr lang="en-US" dirty="0"/>
           </a:p>
@@ -1696,7 +1696,7 @@
             <a:fld id="{B61BEF0D-F0BB-DE4B-95CE-6DB70DBA9567}" type="datetimeFigureOut">
               <a:rPr lang="en-US" dirty="0"/>
               <a:pPr/>
-              <a:t>9/29/2017</a:t>
+              <a:t>10/3/2017</a:t>
             </a:fld>
             <a:endParaRPr lang="en-US" dirty="0"/>
           </a:p>
@@ -2001,7 +2001,7 @@
             <a:fld id="{B61BEF0D-F0BB-DE4B-95CE-6DB70DBA9567}" type="datetimeFigureOut">
               <a:rPr lang="en-US" dirty="0"/>
               <a:pPr/>
-              <a:t>9/29/2017</a:t>
+              <a:t>10/3/2017</a:t>
             </a:fld>
             <a:endParaRPr lang="en-US" dirty="0"/>
           </a:p>
@@ -2316,7 +2316,7 @@
             <a:fld id="{B61BEF0D-F0BB-DE4B-95CE-6DB70DBA9567}" type="datetimeFigureOut">
               <a:rPr lang="en-US" dirty="0"/>
               <a:pPr/>
-              <a:t>9/29/2017</a:t>
+              <a:t>10/3/2017</a:t>
             </a:fld>
             <a:endParaRPr lang="en-US" dirty="0"/>
           </a:p>
@@ -2615,7 +2615,7 @@
             <a:fld id="{B61BEF0D-F0BB-DE4B-95CE-6DB70DBA9567}" type="datetimeFigureOut">
               <a:rPr lang="en-US" dirty="0"/>
               <a:pPr/>
-              <a:t>9/29/2017</a:t>
+              <a:t>10/3/2017</a:t>
             </a:fld>
             <a:endParaRPr lang="en-US" dirty="0"/>
           </a:p>
@@ -2979,7 +2979,7 @@
             <a:fld id="{B61BEF0D-F0BB-DE4B-95CE-6DB70DBA9567}" type="datetimeFigureOut">
               <a:rPr lang="en-US" dirty="0"/>
               <a:pPr/>
-              <a:t>9/29/2017</a:t>
+              <a:t>10/3/2017</a:t>
             </a:fld>
             <a:endParaRPr lang="en-US" dirty="0"/>
           </a:p>
@@ -3150,7 +3150,7 @@
             <a:fld id="{B61BEF0D-F0BB-DE4B-95CE-6DB70DBA9567}" type="datetimeFigureOut">
               <a:rPr lang="en-US" dirty="0"/>
               <a:pPr/>
-              <a:t>9/29/2017</a:t>
+              <a:t>10/3/2017</a:t>
             </a:fld>
             <a:endParaRPr lang="en-US" dirty="0"/>
           </a:p>
@@ -3327,7 +3327,7 @@
             <a:fld id="{B61BEF0D-F0BB-DE4B-95CE-6DB70DBA9567}" type="datetimeFigureOut">
               <a:rPr lang="en-US" dirty="0"/>
               <a:pPr/>
-              <a:t>9/29/2017</a:t>
+              <a:t>10/3/2017</a:t>
             </a:fld>
             <a:endParaRPr lang="en-US" dirty="0"/>
           </a:p>
@@ -3494,7 +3494,7 @@
             <a:fld id="{B61BEF0D-F0BB-DE4B-95CE-6DB70DBA9567}" type="datetimeFigureOut">
               <a:rPr lang="en-US" dirty="0"/>
               <a:pPr/>
-              <a:t>9/29/2017</a:t>
+              <a:t>10/3/2017</a:t>
             </a:fld>
             <a:endParaRPr lang="en-US" dirty="0"/>
           </a:p>
@@ -3741,7 +3741,7 @@
             <a:fld id="{B61BEF0D-F0BB-DE4B-95CE-6DB70DBA9567}" type="datetimeFigureOut">
               <a:rPr lang="en-US" dirty="0"/>
               <a:pPr/>
-              <a:t>9/29/2017</a:t>
+              <a:t>10/3/2017</a:t>
             </a:fld>
             <a:endParaRPr lang="en-US" dirty="0"/>
           </a:p>
@@ -3974,7 +3974,7 @@
             <a:fld id="{B61BEF0D-F0BB-DE4B-95CE-6DB70DBA9567}" type="datetimeFigureOut">
               <a:rPr lang="en-US" dirty="0"/>
               <a:pPr/>
-              <a:t>9/29/2017</a:t>
+              <a:t>10/3/2017</a:t>
             </a:fld>
             <a:endParaRPr lang="en-US" dirty="0"/>
           </a:p>
@@ -4353,7 +4353,7 @@
             <a:fld id="{B61BEF0D-F0BB-DE4B-95CE-6DB70DBA9567}" type="datetimeFigureOut">
               <a:rPr lang="en-US" dirty="0"/>
               <a:pPr/>
-              <a:t>9/29/2017</a:t>
+              <a:t>10/3/2017</a:t>
             </a:fld>
             <a:endParaRPr lang="en-US" dirty="0"/>
           </a:p>
@@ -4468,7 +4468,7 @@
             <a:fld id="{B61BEF0D-F0BB-DE4B-95CE-6DB70DBA9567}" type="datetimeFigureOut">
               <a:rPr lang="en-US" dirty="0"/>
               <a:pPr/>
-              <a:t>9/29/2017</a:t>
+              <a:t>10/3/2017</a:t>
             </a:fld>
             <a:endParaRPr lang="en-US" dirty="0"/>
           </a:p>
@@ -4560,7 +4560,7 @@
             <a:fld id="{B61BEF0D-F0BB-DE4B-95CE-6DB70DBA9567}" type="datetimeFigureOut">
               <a:rPr lang="en-US" dirty="0"/>
               <a:pPr/>
-              <a:t>9/29/2017</a:t>
+              <a:t>10/3/2017</a:t>
             </a:fld>
             <a:endParaRPr lang="en-US" dirty="0"/>
           </a:p>
@@ -4812,7 +4812,7 @@
             <a:fld id="{B61BEF0D-F0BB-DE4B-95CE-6DB70DBA9567}" type="datetimeFigureOut">
               <a:rPr lang="en-US" dirty="0"/>
               <a:pPr/>
-              <a:t>9/29/2017</a:t>
+              <a:t>10/3/2017</a:t>
             </a:fld>
             <a:endParaRPr lang="en-US" dirty="0"/>
           </a:p>
@@ -5092,7 +5092,7 @@
             <a:fld id="{B61BEF0D-F0BB-DE4B-95CE-6DB70DBA9567}" type="datetimeFigureOut">
               <a:rPr lang="en-US" dirty="0"/>
               <a:pPr/>
-              <a:t>9/29/2017</a:t>
+              <a:t>10/3/2017</a:t>
             </a:fld>
             <a:endParaRPr lang="en-US" dirty="0"/>
           </a:p>
@@ -5495,7 +5495,7 @@
             <a:fld id="{B61BEF0D-F0BB-DE4B-95CE-6DB70DBA9567}" type="datetimeFigureOut">
               <a:rPr lang="en-US" dirty="0"/>
               <a:pPr/>
-              <a:t>9/29/2017</a:t>
+              <a:t>10/3/2017</a:t>
             </a:fld>
             <a:endParaRPr lang="en-US" dirty="0"/>
           </a:p>
@@ -6122,44 +6122,65 @@
         <p:spPr>
           <a:xfrm>
             <a:off x="885547" y="1262358"/>
-            <a:ext cx="10368501" cy="2614058"/>
+            <a:ext cx="10368501" cy="3283266"/>
           </a:xfrm>
         </p:spPr>
         <p:txBody>
           <a:bodyPr>
-            <a:normAutofit/>
+            <a:normAutofit fontScale="85000" lnSpcReduction="10000"/>
           </a:bodyPr>
           <a:lstStyle/>
           <a:p>
-            <a:r>
-              <a:rPr lang="en-US" dirty="0"/>
+            <a:endParaRPr lang="en-US" dirty="0"/>
+          </a:p>
+          <a:p>
+            <a:r>
+              <a:rPr lang="en-US" sz="2400" dirty="0"/>
+              <a:t>ASP.NET Core is designed from the ground up to support dependency injection</a:t>
+            </a:r>
+          </a:p>
+          <a:p>
+            <a:r>
+              <a:rPr lang="en-US" sz="2400" dirty="0"/>
               <a:t>Built-in dependency injection allows loose coupling between ASP.NET Core components and their dependencies</a:t>
             </a:r>
           </a:p>
           <a:p>
-            <a:pPr lvl="1"/>
-            <a:r>
-              <a:rPr lang="en-US" dirty="0"/>
-              <a:t>Alternative to the global/static access pattern</a:t>
-            </a:r>
-          </a:p>
-          <a:p>
-            <a:r>
-              <a:rPr lang="en-US" dirty="0"/>
+            <a:r>
+              <a:rPr lang="en-US" sz="2400" dirty="0"/>
               <a:t>Makes it easy for different dependencies to be provided in different environments</a:t>
             </a:r>
           </a:p>
           <a:p>
             <a:r>
-              <a:rPr lang="en-US" dirty="0"/>
+              <a:rPr lang="en-US" sz="2400" dirty="0"/>
+              <a:t>Configure built in container’s services in </a:t>
+            </a:r>
+            <a:r>
+              <a:rPr lang="en-US" sz="2400" dirty="0" err="1"/>
+              <a:t>ConfigureServices</a:t>
+            </a:r>
+            <a:r>
+              <a:rPr lang="en-US" sz="2400" dirty="0"/>
+              <a:t> in </a:t>
+            </a:r>
+            <a:r>
+              <a:rPr lang="en-US" sz="2400" dirty="0" err="1"/>
+              <a:t>Startup.cs</a:t>
+            </a:r>
+            <a:endParaRPr lang="en-US" sz="2400" dirty="0"/>
+          </a:p>
+          <a:p>
+            <a:r>
+              <a:rPr lang="en-US" sz="2400" dirty="0"/>
               <a:t>Can use non-default containers to interop with other DI technologies (like </a:t>
             </a:r>
             <a:r>
-              <a:rPr lang="en-US" dirty="0" err="1"/>
+              <a:rPr lang="en-US" sz="2400" dirty="0" err="1"/>
               <a:t>Autofac</a:t>
             </a:r>
             <a:r>
-              <a:rPr lang="en-US" dirty="0"/>
+              <a:rPr lang="en-US" sz="2400" dirty="0"/>
               <a:t>)</a:t>
             </a:r>
           </a:p>
@@ -6293,7 +6314,6 @@
             </a:r>
           </a:p>
           <a:p>
-            <a:pPr lvl="1"/>
             <a:r>
               <a:rPr lang="en-US" dirty="0"/>
               <a:t>It is better to use shorter service lifetimes</a:t>

</xml_diff>